<commit_message>
BX bài tập bài 12
</commit_message>
<xml_diff>
--- a/Bai 12 Cac phuong phap xay dung chi muc.pptx
+++ b/Bai 12 Cac phuong phap xay dung chi muc.pptx
@@ -5,7 +5,7 @@
     <p:sldMasterId id="2147483652" r:id="rId1"/>
   </p:sldMasterIdLst>
   <p:notesMasterIdLst>
-    <p:notesMasterId r:id="rId34"/>
+    <p:notesMasterId r:id="rId35"/>
   </p:notesMasterIdLst>
   <p:sldIdLst>
     <p:sldId id="363" r:id="rId2"/>
@@ -39,7 +39,8 @@
     <p:sldId id="508" r:id="rId30"/>
     <p:sldId id="507" r:id="rId31"/>
     <p:sldId id="568" r:id="rId32"/>
-    <p:sldId id="554" r:id="rId33"/>
+    <p:sldId id="569" r:id="rId33"/>
+    <p:sldId id="554" r:id="rId34"/>
   </p:sldIdLst>
   <p:sldSz cx="9144000" cy="6858000" type="screen4x3"/>
   <p:notesSz cx="6858000" cy="9144000"/>
@@ -170,7 +171,7 @@
   </p:defaultTextStyle>
   <p:extLst>
     <p:ext uri="{EFAFB233-063F-42B5-8137-9DF3F51BA10A}">
-      <p15:sldGuideLst xmlns:p15="http://schemas.microsoft.com/office/powerpoint/2012/main" xmlns="">
+      <p15:sldGuideLst xmlns="" xmlns:p15="http://schemas.microsoft.com/office/powerpoint/2012/main">
         <p15:guide id="1" orient="horz" pos="2160">
           <p15:clr>
             <a:srgbClr val="A4A3A4"/>
@@ -24245,11 +24246,7 @@
             </a:r>
             <a:r>
               <a:rPr lang="vi-VN" smtClean="0"/>
-              <a:t>tập </a:t>
-            </a:r>
-            <a:r>
-              <a:rPr lang="vi-VN" smtClean="0"/>
-              <a:t>12.1</a:t>
+              <a:t>tập 12.1</a:t>
             </a:r>
             <a:endParaRPr lang="vi-VN" dirty="0"/>
           </a:p>
@@ -24275,6 +24272,9 @@
           <a:bodyPr/>
           <a:lstStyle/>
           <a:p>
+            <a:pPr marL="0" indent="0" algn="just">
+              <a:buNone/>
+            </a:pPr>
             <a:r>
               <a:rPr lang="vi-VN" dirty="0" smtClean="0"/>
               <a:t>Cho n = 2, và 1 &lt;= T &lt;= 30, hãy thực hiện giải </a:t>
@@ -24582,6 +24582,320 @@
       </p:grpSpPr>
       <p:sp>
         <p:nvSpPr>
+          <p:cNvPr id="6" name="Slide Number Placeholder 3"/>
+          <p:cNvSpPr>
+            <a:spLocks noGrp="1"/>
+          </p:cNvSpPr>
+          <p:nvPr>
+            <p:ph type="sldNum" sz="quarter" idx="12"/>
+          </p:nvPr>
+        </p:nvSpPr>
+        <p:spPr/>
+        <p:txBody>
+          <a:bodyPr/>
+          <a:lstStyle/>
+          <a:p>
+            <a:fld id="{909FCE1E-61F3-4ECB-9018-211D5A752018}" type="slidenum">
+              <a:rPr lang="vi-VN"/>
+              <a:pPr/>
+              <a:t>32</a:t>
+            </a:fld>
+            <a:endParaRPr lang="vi-VN"/>
+          </a:p>
+        </p:txBody>
+      </p:sp>
+      <p:sp>
+        <p:nvSpPr>
+          <p:cNvPr id="450562" name="Title 1"/>
+          <p:cNvSpPr>
+            <a:spLocks noGrp="1"/>
+          </p:cNvSpPr>
+          <p:nvPr>
+            <p:ph type="title" idx="4294967295"/>
+          </p:nvPr>
+        </p:nvSpPr>
+        <p:spPr/>
+        <p:txBody>
+          <a:bodyPr/>
+          <a:lstStyle/>
+          <a:p>
+            <a:r>
+              <a:rPr lang="vi-VN" dirty="0" smtClean="0"/>
+              <a:t>Bài </a:t>
+            </a:r>
+            <a:r>
+              <a:rPr lang="vi-VN" smtClean="0"/>
+              <a:t>tập </a:t>
+            </a:r>
+            <a:r>
+              <a:rPr lang="vi-VN" smtClean="0"/>
+              <a:t>12.2</a:t>
+            </a:r>
+            <a:endParaRPr lang="vi-VN" dirty="0"/>
+          </a:p>
+        </p:txBody>
+      </p:sp>
+      <p:sp>
+        <p:nvSpPr>
+          <p:cNvPr id="450563" name="Content Placeholder 2"/>
+          <p:cNvSpPr>
+            <a:spLocks noGrp="1"/>
+          </p:cNvSpPr>
+          <p:nvPr>
+            <p:ph idx="4294967295"/>
+          </p:nvPr>
+        </p:nvSpPr>
+        <p:spPr>
+          <a:xfrm>
+            <a:off x="611560" y="2060848"/>
+            <a:ext cx="8208590" cy="4464496"/>
+          </a:xfrm>
+        </p:spPr>
+        <p:txBody>
+          <a:bodyPr/>
+          <a:lstStyle/>
+          <a:p>
+            <a:pPr marL="0" indent="0">
+              <a:buNone/>
+            </a:pPr>
+            <a:r>
+              <a:rPr lang="en-US" smtClean="0"/>
+              <a:t>Chỉ mục phụ có thể ảnh hưởng đáng kể đến chất lượng thống kê trên bộ dữ liệu. Ví dụ điển hình là idf, được định nghĩa như sau log(N/df</a:t>
+            </a:r>
+            <a:r>
+              <a:rPr lang="en-US" baseline="-25000" smtClean="0"/>
+              <a:t>i</a:t>
+            </a:r>
+            <a:r>
+              <a:rPr lang="en-US" smtClean="0"/>
+              <a:t>) trong đó N là số lượng văn bản và df</a:t>
+            </a:r>
+            <a:r>
+              <a:rPr lang="en-US" baseline="-25000" smtClean="0"/>
+              <a:t>i</a:t>
+            </a:r>
+            <a:r>
+              <a:rPr lang="en-US" smtClean="0"/>
+              <a:t> là số văn bản chứa từ thứ i. Hãy chứng minh rằng một chỉ mục phụ dù nhỏ cũng có thể gây sai lệch lớn đến idf nếu chỉ tính trên chỉ mục chính. </a:t>
+            </a:r>
+          </a:p>
+          <a:p>
+            <a:pPr marL="0" indent="0">
+              <a:buNone/>
+            </a:pPr>
+            <a:r>
+              <a:rPr lang="en-US" smtClean="0"/>
+              <a:t>Gợi ý: xét một từ hiếm nhưng đột ngột xuất hiện thường xuyên.</a:t>
+            </a:r>
+            <a:endParaRPr lang="vi-VN" dirty="0"/>
+          </a:p>
+        </p:txBody>
+      </p:sp>
+      <p:sp>
+        <p:nvSpPr>
+          <p:cNvPr id="450564" name="TextBox 4"/>
+          <p:cNvSpPr txBox="1">
+            <a:spLocks noChangeArrowheads="1"/>
+          </p:cNvSpPr>
+          <p:nvPr/>
+        </p:nvSpPr>
+        <p:spPr bwMode="auto">
+          <a:xfrm>
+            <a:off x="7620000" y="-33338"/>
+            <a:ext cx="963613" cy="336551"/>
+          </a:xfrm>
+          <a:prstGeom prst="rect">
+            <a:avLst/>
+          </a:prstGeom>
+          <a:noFill/>
+          <a:ln>
+            <a:noFill/>
+          </a:ln>
+          <a:extLst>
+            <a:ext uri="{909E8E84-426E-40DD-AFC4-6F175D3DCCD1}">
+              <a14:hiddenFill xmlns:a14="http://schemas.microsoft.com/office/drawing/2010/main">
+                <a:solidFill>
+                  <a:srgbClr val="FFFFFF"/>
+                </a:solidFill>
+              </a14:hiddenFill>
+            </a:ext>
+            <a:ext uri="{91240B29-F687-4F45-9708-019B960494DF}">
+              <a14:hiddenLine xmlns:a14="http://schemas.microsoft.com/office/drawing/2010/main" w="9525">
+                <a:solidFill>
+                  <a:srgbClr val="000000"/>
+                </a:solidFill>
+                <a:miter lim="800000"/>
+                <a:headEnd/>
+                <a:tailEnd/>
+              </a14:hiddenLine>
+            </a:ext>
+          </a:extLst>
+        </p:spPr>
+        <p:txBody>
+          <a:bodyPr wrap="none" anchor="ctr">
+            <a:spAutoFit/>
+          </a:bodyPr>
+          <a:lstStyle>
+            <a:lvl1pPr>
+              <a:defRPr>
+                <a:solidFill>
+                  <a:schemeClr val="tx1"/>
+                </a:solidFill>
+                <a:latin typeface="Tahoma" panose="020B0604030504040204" pitchFamily="34" charset="0"/>
+                <a:cs typeface="Tahoma" panose="020B0604030504040204" pitchFamily="34" charset="0"/>
+              </a:defRPr>
+            </a:lvl1pPr>
+            <a:lvl2pPr marL="742950" indent="-285750">
+              <a:defRPr>
+                <a:solidFill>
+                  <a:schemeClr val="tx1"/>
+                </a:solidFill>
+                <a:latin typeface="Tahoma" panose="020B0604030504040204" pitchFamily="34" charset="0"/>
+                <a:cs typeface="Tahoma" panose="020B0604030504040204" pitchFamily="34" charset="0"/>
+              </a:defRPr>
+            </a:lvl2pPr>
+            <a:lvl3pPr marL="1143000" indent="-228600">
+              <a:defRPr>
+                <a:solidFill>
+                  <a:schemeClr val="tx1"/>
+                </a:solidFill>
+                <a:latin typeface="Tahoma" panose="020B0604030504040204" pitchFamily="34" charset="0"/>
+                <a:cs typeface="Tahoma" panose="020B0604030504040204" pitchFamily="34" charset="0"/>
+              </a:defRPr>
+            </a:lvl3pPr>
+            <a:lvl4pPr marL="1600200" indent="-228600">
+              <a:defRPr>
+                <a:solidFill>
+                  <a:schemeClr val="tx1"/>
+                </a:solidFill>
+                <a:latin typeface="Tahoma" panose="020B0604030504040204" pitchFamily="34" charset="0"/>
+                <a:cs typeface="Tahoma" panose="020B0604030504040204" pitchFamily="34" charset="0"/>
+              </a:defRPr>
+            </a:lvl4pPr>
+            <a:lvl5pPr marL="2057400" indent="-228600">
+              <a:defRPr>
+                <a:solidFill>
+                  <a:schemeClr val="tx1"/>
+                </a:solidFill>
+                <a:latin typeface="Tahoma" panose="020B0604030504040204" pitchFamily="34" charset="0"/>
+                <a:cs typeface="Tahoma" panose="020B0604030504040204" pitchFamily="34" charset="0"/>
+              </a:defRPr>
+            </a:lvl5pPr>
+            <a:lvl6pPr marL="2514600" indent="-228600" fontAlgn="base">
+              <a:spcBef>
+                <a:spcPct val="0"/>
+              </a:spcBef>
+              <a:spcAft>
+                <a:spcPct val="0"/>
+              </a:spcAft>
+              <a:defRPr>
+                <a:solidFill>
+                  <a:schemeClr val="tx1"/>
+                </a:solidFill>
+                <a:latin typeface="Tahoma" panose="020B0604030504040204" pitchFamily="34" charset="0"/>
+                <a:cs typeface="Tahoma" panose="020B0604030504040204" pitchFamily="34" charset="0"/>
+              </a:defRPr>
+            </a:lvl6pPr>
+            <a:lvl7pPr marL="2971800" indent="-228600" fontAlgn="base">
+              <a:spcBef>
+                <a:spcPct val="0"/>
+              </a:spcBef>
+              <a:spcAft>
+                <a:spcPct val="0"/>
+              </a:spcAft>
+              <a:defRPr>
+                <a:solidFill>
+                  <a:schemeClr val="tx1"/>
+                </a:solidFill>
+                <a:latin typeface="Tahoma" panose="020B0604030504040204" pitchFamily="34" charset="0"/>
+                <a:cs typeface="Tahoma" panose="020B0604030504040204" pitchFamily="34" charset="0"/>
+              </a:defRPr>
+            </a:lvl7pPr>
+            <a:lvl8pPr marL="3429000" indent="-228600" fontAlgn="base">
+              <a:spcBef>
+                <a:spcPct val="0"/>
+              </a:spcBef>
+              <a:spcAft>
+                <a:spcPct val="0"/>
+              </a:spcAft>
+              <a:defRPr>
+                <a:solidFill>
+                  <a:schemeClr val="tx1"/>
+                </a:solidFill>
+                <a:latin typeface="Tahoma" panose="020B0604030504040204" pitchFamily="34" charset="0"/>
+                <a:cs typeface="Tahoma" panose="020B0604030504040204" pitchFamily="34" charset="0"/>
+              </a:defRPr>
+            </a:lvl8pPr>
+            <a:lvl9pPr marL="3886200" indent="-228600" fontAlgn="base">
+              <a:spcBef>
+                <a:spcPct val="0"/>
+              </a:spcBef>
+              <a:spcAft>
+                <a:spcPct val="0"/>
+              </a:spcAft>
+              <a:defRPr>
+                <a:solidFill>
+                  <a:schemeClr val="tx1"/>
+                </a:solidFill>
+                <a:latin typeface="Tahoma" panose="020B0604030504040204" pitchFamily="34" charset="0"/>
+                <a:cs typeface="Tahoma" panose="020B0604030504040204" pitchFamily="34" charset="0"/>
+              </a:defRPr>
+            </a:lvl9pPr>
+          </a:lstStyle>
+          <a:p>
+            <a:r>
+              <a:rPr lang="en-US" sz="1600">
+                <a:solidFill>
+                  <a:srgbClr val="FBFCFF"/>
+                </a:solidFill>
+                <a:latin typeface="Lucida Sans" pitchFamily="34" charset="0"/>
+                <a:ea typeface="Arial Unicode MS" panose="020B0604020202020204" pitchFamily="34" charset="-128"/>
+                <a:cs typeface="Arial Unicode MS" panose="020B0604020202020204" pitchFamily="34" charset="-128"/>
+              </a:rPr>
+              <a:t>Sec. 4.5</a:t>
+            </a:r>
+          </a:p>
+        </p:txBody>
+      </p:sp>
+    </p:spTree>
+    <p:extLst>
+      <p:ext uri="{BB962C8B-B14F-4D97-AF65-F5344CB8AC3E}">
+        <p14:creationId xmlns:p14="http://schemas.microsoft.com/office/powerpoint/2010/main" val="4241846409"/>
+      </p:ext>
+    </p:extLst>
+  </p:cSld>
+  <p:clrMapOvr>
+    <a:masterClrMapping/>
+  </p:clrMapOvr>
+  <p:timing>
+    <p:tnLst>
+      <p:par>
+        <p:cTn id="1" dur="indefinite" restart="never" nodeType="tmRoot"/>
+      </p:par>
+    </p:tnLst>
+  </p:timing>
+</p:sld>
+</file>
+
+<file path=ppt/slides/slide33.xml><?xml version="1.0" encoding="utf-8"?>
+<p:sld xmlns:a="http://schemas.openxmlformats.org/drawingml/2006/main" xmlns:r="http://schemas.openxmlformats.org/officeDocument/2006/relationships" xmlns:p="http://schemas.openxmlformats.org/presentationml/2006/main">
+  <p:cSld>
+    <p:spTree>
+      <p:nvGrpSpPr>
+        <p:cNvPr id="1" name=""/>
+        <p:cNvGrpSpPr/>
+        <p:nvPr/>
+      </p:nvGrpSpPr>
+      <p:grpSpPr>
+        <a:xfrm>
+          <a:off x="0" y="0"/>
+          <a:ext cx="0" cy="0"/>
+          <a:chOff x="0" y="0"/>
+          <a:chExt cx="0" cy="0"/>
+        </a:xfrm>
+      </p:grpSpPr>
+      <p:sp>
+        <p:nvSpPr>
           <p:cNvPr id="5" name="Slide Number Placeholder 4"/>
           <p:cNvSpPr>
             <a:spLocks noGrp="1"/>
@@ -24598,7 +24912,7 @@
             <a:fld id="{72275E6C-F7D3-44BD-9F93-EAD73DC7EBB7}" type="slidenum">
               <a:rPr lang="vi-VN"/>
               <a:pPr/>
-              <a:t>32</a:t>
+              <a:t>33</a:t>
             </a:fld>
             <a:endParaRPr lang="vi-VN"/>
           </a:p>
@@ -26925,7 +27239,7 @@
   </a:extraClrSchemeLst>
   <a:extLst>
     <a:ext uri="{05A4C25C-085E-4340-85A3-A5531E510DB2}">
-      <thm15:themeFamily xmlns:thm15="http://schemas.microsoft.com/office/thememl/2012/main" xmlns="" name="Office Theme" id="{62F939B6-93AF-4DB8-9C6B-D6C7DFDC589F}" vid="{4A3C46E8-61CC-4603-A589-7422A47A8E4A}"/>
+      <thm15:themeFamily xmlns="" xmlns:thm15="http://schemas.microsoft.com/office/thememl/2012/main" name="Office Theme" id="{62F939B6-93AF-4DB8-9C6B-D6C7DFDC589F}" vid="{4A3C46E8-61CC-4603-A589-7422A47A8E4A}"/>
     </a:ext>
   </a:extLst>
 </a:theme>
@@ -27186,7 +27500,7 @@
   <a:extraClrSchemeLst/>
   <a:extLst>
     <a:ext uri="{05A4C25C-085E-4340-85A3-A5531E510DB2}">
-      <thm15:themeFamily xmlns:thm15="http://schemas.microsoft.com/office/thememl/2012/main" xmlns="" name="Office Theme" id="{62F939B6-93AF-4DB8-9C6B-D6C7DFDC589F}" vid="{4A3C46E8-61CC-4603-A589-7422A47A8E4A}"/>
+      <thm15:themeFamily xmlns="" xmlns:thm15="http://schemas.microsoft.com/office/thememl/2012/main" name="Office Theme" id="{62F939B6-93AF-4DB8-9C6B-D6C7DFDC589F}" vid="{4A3C46E8-61CC-4603-A589-7422A47A8E4A}"/>
     </a:ext>
   </a:extLst>
 </a:theme>

</xml_diff>

<commit_message>
Dieu chinh bai 12
</commit_message>
<xml_diff>
--- a/Bai 12 Cac phuong phap xay dung chi muc.pptx
+++ b/Bai 12 Cac phuong phap xay dung chi muc.pptx
@@ -171,7 +171,7 @@
   </p:defaultTextStyle>
   <p:extLst>
     <p:ext uri="{EFAFB233-063F-42B5-8137-9DF3F51BA10A}">
-      <p15:sldGuideLst xmlns="" xmlns:p15="http://schemas.microsoft.com/office/powerpoint/2012/main">
+      <p15:sldGuideLst xmlns:p15="http://schemas.microsoft.com/office/powerpoint/2012/main" xmlns="">
         <p15:guide id="1" orient="horz" pos="2160">
           <p15:clr>
             <a:srgbClr val="A4A3A4"/>
@@ -11327,34 +11327,178 @@
             <a:pPr lvl="1" algn="just"/>
             <a:r>
               <a:rPr lang="vi-VN" dirty="0" smtClean="0"/>
-              <a:t>Không cần cung cấp mã từ duy nhất trên toàn bộ dữ liệu;</a:t>
+              <a:t>Không cần </a:t>
+            </a:r>
+            <a:r>
+              <a:rPr lang="en-US" dirty="0" err="1" smtClean="0"/>
+              <a:t>quản</a:t>
+            </a:r>
+            <a:r>
+              <a:rPr lang="en-US" dirty="0" smtClean="0"/>
+              <a:t> </a:t>
+            </a:r>
+            <a:r>
+              <a:rPr lang="en-US" dirty="0" err="1" smtClean="0"/>
+              <a:t>lý</a:t>
+            </a:r>
+            <a:r>
+              <a:rPr lang="en-US" dirty="0" smtClean="0"/>
+              <a:t> </a:t>
+            </a:r>
+            <a:r>
+              <a:rPr lang="en-US" dirty="0" err="1" smtClean="0"/>
+              <a:t>mã</a:t>
+            </a:r>
+            <a:r>
+              <a:rPr lang="en-US" dirty="0" smtClean="0"/>
+              <a:t> </a:t>
+            </a:r>
+            <a:r>
+              <a:rPr lang="en-US" dirty="0" err="1" smtClean="0"/>
+              <a:t>từ</a:t>
+            </a:r>
+            <a:r>
+              <a:rPr lang="en-US" dirty="0" smtClean="0"/>
+              <a:t> </a:t>
+            </a:r>
+            <a:r>
+              <a:rPr lang="en-US" dirty="0" err="1" smtClean="0"/>
+              <a:t>trong</a:t>
+            </a:r>
+            <a:r>
+              <a:rPr lang="en-US" dirty="0" smtClean="0"/>
+              <a:t> </a:t>
+            </a:r>
+            <a:r>
+              <a:rPr lang="en-US" dirty="0" err="1" smtClean="0"/>
+              <a:t>quá</a:t>
+            </a:r>
+            <a:r>
+              <a:rPr lang="en-US" dirty="0" smtClean="0"/>
+              <a:t> </a:t>
+            </a:r>
+            <a:r>
+              <a:rPr lang="en-US" dirty="0" err="1" smtClean="0"/>
+              <a:t>trình</a:t>
+            </a:r>
+            <a:r>
+              <a:rPr lang="en-US" dirty="0" smtClean="0"/>
+              <a:t> </a:t>
+            </a:r>
+            <a:r>
+              <a:rPr lang="en-US" dirty="0" err="1" smtClean="0"/>
+              <a:t>xây</a:t>
+            </a:r>
+            <a:r>
+              <a:rPr lang="en-US" dirty="0" smtClean="0"/>
+              <a:t> </a:t>
+            </a:r>
+            <a:r>
+              <a:rPr lang="en-US" dirty="0" err="1" smtClean="0"/>
+              <a:t>dựng</a:t>
+            </a:r>
+            <a:r>
+              <a:rPr lang="en-US" dirty="0" smtClean="0"/>
+              <a:t> </a:t>
+            </a:r>
+            <a:r>
+              <a:rPr lang="en-US" dirty="0" err="1" smtClean="0"/>
+              <a:t>chỉ</a:t>
+            </a:r>
+            <a:r>
+              <a:rPr lang="en-US" dirty="0" smtClean="0"/>
+              <a:t> </a:t>
+            </a:r>
+            <a:r>
+              <a:rPr lang="en-US" dirty="0" err="1" smtClean="0"/>
+              <a:t>mục</a:t>
+            </a:r>
+            <a:r>
+              <a:rPr lang="en-US" dirty="0" smtClean="0"/>
+              <a:t> </a:t>
+            </a:r>
+            <a:r>
+              <a:rPr lang="en-US" dirty="0" err="1" smtClean="0"/>
+              <a:t>khối</a:t>
+            </a:r>
+            <a:r>
+              <a:rPr lang="vi-VN" dirty="0" smtClean="0"/>
+              <a:t>;</a:t>
             </a:r>
           </a:p>
           <a:p>
             <a:pPr lvl="1" algn="just"/>
             <a:r>
-              <a:rPr lang="vi-VN" dirty="0" smtClean="0"/>
-              <a:t>Không </a:t>
-            </a:r>
-            <a:r>
-              <a:rPr lang="vi-VN" dirty="0"/>
-              <a:t>cần </a:t>
-            </a:r>
-            <a:r>
-              <a:rPr lang="vi-VN" dirty="0" smtClean="0"/>
-              <a:t>lưu từ </a:t>
-            </a:r>
-            <a:r>
-              <a:rPr lang="vi-VN" dirty="0"/>
-              <a:t>điển </a:t>
-            </a:r>
-            <a:r>
-              <a:rPr lang="vi-VN" dirty="0" smtClean="0"/>
-              <a:t>đầy đủ cho bộ dữ liệu trong </a:t>
-            </a:r>
-            <a:r>
-              <a:rPr lang="vi-VN" dirty="0"/>
-              <a:t>bộ nhớ</a:t>
+              <a:rPr lang="en-US" dirty="0" err="1" smtClean="0"/>
+              <a:t>Kích</a:t>
+            </a:r>
+            <a:r>
+              <a:rPr lang="en-US" dirty="0" smtClean="0"/>
+              <a:t> </a:t>
+            </a:r>
+            <a:r>
+              <a:rPr lang="en-US" dirty="0" err="1" smtClean="0"/>
+              <a:t>thước</a:t>
+            </a:r>
+            <a:r>
+              <a:rPr lang="en-US" dirty="0" smtClean="0"/>
+              <a:t> </a:t>
+            </a:r>
+            <a:r>
+              <a:rPr lang="en-US" dirty="0" err="1" smtClean="0"/>
+              <a:t>khối</a:t>
+            </a:r>
+            <a:r>
+              <a:rPr lang="en-US" dirty="0" smtClean="0"/>
+              <a:t> </a:t>
+            </a:r>
+            <a:r>
+              <a:rPr lang="en-US" dirty="0" err="1" smtClean="0"/>
+              <a:t>trong</a:t>
+            </a:r>
+            <a:r>
+              <a:rPr lang="en-US" dirty="0" smtClean="0"/>
+              <a:t> </a:t>
+            </a:r>
+            <a:r>
+              <a:rPr lang="en-US" dirty="0" err="1" smtClean="0"/>
+              <a:t>bộ</a:t>
+            </a:r>
+            <a:r>
+              <a:rPr lang="en-US" dirty="0" smtClean="0"/>
+              <a:t> </a:t>
+            </a:r>
+            <a:r>
+              <a:rPr lang="en-US" dirty="0" err="1" smtClean="0"/>
+              <a:t>nhớ</a:t>
+            </a:r>
+            <a:r>
+              <a:rPr lang="en-US" dirty="0" smtClean="0"/>
+              <a:t> </a:t>
+            </a:r>
+            <a:r>
+              <a:rPr lang="en-US" dirty="0" err="1" smtClean="0"/>
+              <a:t>lớn</a:t>
+            </a:r>
+            <a:r>
+              <a:rPr lang="en-US" dirty="0" smtClean="0"/>
+              <a:t> </a:t>
+            </a:r>
+            <a:r>
+              <a:rPr lang="en-US" dirty="0" err="1" smtClean="0"/>
+              <a:t>hơn</a:t>
+            </a:r>
+            <a:r>
+              <a:rPr lang="en-US" dirty="0" smtClean="0"/>
+              <a:t> so </a:t>
+            </a:r>
+            <a:r>
+              <a:rPr lang="en-US" dirty="0" err="1" smtClean="0"/>
+              <a:t>với</a:t>
+            </a:r>
+            <a:r>
+              <a:rPr lang="en-US" dirty="0" smtClean="0"/>
+              <a:t> BSBI</a:t>
             </a:r>
             <a:r>
               <a:rPr lang="vi-VN" dirty="0" smtClean="0"/>
@@ -11372,7 +11516,63 @@
             <a:pPr lvl="1" algn="just"/>
             <a:r>
               <a:rPr lang="vi-VN" dirty="0" smtClean="0"/>
-              <a:t>Không cần thực hiện sắp xếp danh sách thẻ định vị.</a:t>
+              <a:t>Không cần thực hiện sắp xếp danh sách thẻ định vị</a:t>
+            </a:r>
+            <a:endParaRPr lang="en-US" dirty="0" smtClean="0"/>
+          </a:p>
+          <a:p>
+            <a:pPr lvl="1" algn="just"/>
+            <a:r>
+              <a:rPr lang="en-US" dirty="0" err="1" smtClean="0"/>
+              <a:t>Tiết</a:t>
+            </a:r>
+            <a:r>
+              <a:rPr lang="en-US" dirty="0" smtClean="0"/>
+              <a:t> </a:t>
+            </a:r>
+            <a:r>
+              <a:rPr lang="en-US" dirty="0" err="1" smtClean="0"/>
+              <a:t>kiệm</a:t>
+            </a:r>
+            <a:r>
+              <a:rPr lang="en-US" dirty="0" smtClean="0"/>
+              <a:t> </a:t>
+            </a:r>
+            <a:r>
+              <a:rPr lang="en-US" dirty="0" err="1" smtClean="0"/>
+              <a:t>bộ</a:t>
+            </a:r>
+            <a:r>
+              <a:rPr lang="en-US" dirty="0" smtClean="0"/>
+              <a:t> </a:t>
+            </a:r>
+            <a:r>
+              <a:rPr lang="en-US" dirty="0" err="1" smtClean="0"/>
+              <a:t>nhớ</a:t>
+            </a:r>
+            <a:r>
+              <a:rPr lang="en-US" dirty="0" smtClean="0"/>
+              <a:t> </a:t>
+            </a:r>
+            <a:r>
+              <a:rPr lang="en-US" dirty="0" err="1" smtClean="0"/>
+              <a:t>hơn</a:t>
+            </a:r>
+            <a:r>
+              <a:rPr lang="en-US" dirty="0" smtClean="0"/>
+              <a:t> so </a:t>
+            </a:r>
+            <a:r>
+              <a:rPr lang="en-US" dirty="0" err="1" smtClean="0"/>
+              <a:t>với</a:t>
+            </a:r>
+            <a:r>
+              <a:rPr lang="en-US" dirty="0" smtClean="0"/>
+              <a:t> BSBI</a:t>
+            </a:r>
+            <a:r>
+              <a:rPr lang="vi-VN" dirty="0" smtClean="0"/>
+              <a:t>.</a:t>
             </a:r>
           </a:p>
         </p:txBody>
@@ -11552,7 +11752,7 @@
         <p:spPr>
           <a:xfrm>
             <a:off x="708596" y="5085184"/>
-            <a:ext cx="7900045" cy="1323439"/>
+            <a:ext cx="7900045" cy="1446550"/>
           </a:xfrm>
           <a:prstGeom prst="rect">
             <a:avLst/>
@@ -11566,34 +11766,224 @@
           <a:lstStyle/>
           <a:p>
             <a:r>
-              <a:rPr lang="vi-VN" sz="2000" dirty="0" smtClean="0">
+              <a:rPr lang="vi-VN" sz="2200" dirty="0" smtClean="0">
                 <a:solidFill>
                   <a:schemeClr val="tx2"/>
                 </a:solidFill>
               </a:rPr>
-              <a:t>Xây dựng chỉ mục một lượt trong bộ nhớ chính: SPIMI: Single-pass in-memory indexing;</a:t>
-            </a:r>
-          </a:p>
-          <a:p>
-            <a:r>
-              <a:rPr lang="vi-VN" sz="2000" dirty="0" smtClean="0">
+              <a:t>Xây dựng chỉ mục một lượt trong bộ nhớ : SPIMI: Single-pass in-memory indexing;</a:t>
+            </a:r>
+          </a:p>
+          <a:p>
+            <a:r>
+              <a:rPr lang="en-US" sz="2200" dirty="0" smtClean="0">
                 <a:solidFill>
                   <a:schemeClr val="tx2"/>
                 </a:solidFill>
               </a:rPr>
-              <a:t>Chúng ta có thể xây dựng chỉ mục ngược đầy đủ cho mỗi khối;</a:t>
-            </a:r>
-          </a:p>
-          <a:p>
-            <a:r>
-              <a:rPr lang="vi-VN" sz="2000" dirty="0" smtClean="0">
+              <a:t>X</a:t>
+            </a:r>
+            <a:r>
+              <a:rPr lang="vi-VN" sz="2200" dirty="0" smtClean="0">
                 <a:solidFill>
                   <a:schemeClr val="tx2"/>
                 </a:solidFill>
               </a:rPr>
-              <a:t>Sau đó có thể hợp nhất các chỉ mục con lại thành một chỉ mục.</a:t>
-            </a:r>
-            <a:endParaRPr lang="vi-VN" sz="2000" dirty="0">
+              <a:t>ây dựng chỉ mục ngược đầy đủ cho mỗi khối</a:t>
+            </a:r>
+            <a:r>
+              <a:rPr lang="en-US" sz="2200" dirty="0" smtClean="0">
+                <a:solidFill>
+                  <a:schemeClr val="tx2"/>
+                </a:solidFill>
+              </a:rPr>
+              <a:t> -&gt; </a:t>
+            </a:r>
+            <a:r>
+              <a:rPr lang="en-US" sz="2200" dirty="0" err="1" smtClean="0">
+                <a:solidFill>
+                  <a:schemeClr val="tx2"/>
+                </a:solidFill>
+              </a:rPr>
+              <a:t>Sắp</a:t>
+            </a:r>
+            <a:r>
+              <a:rPr lang="en-US" sz="2200" dirty="0" smtClean="0">
+                <a:solidFill>
+                  <a:schemeClr val="tx2"/>
+                </a:solidFill>
+              </a:rPr>
+              <a:t> </a:t>
+            </a:r>
+            <a:r>
+              <a:rPr lang="en-US" sz="2200" dirty="0" err="1" smtClean="0">
+                <a:solidFill>
+                  <a:schemeClr val="tx2"/>
+                </a:solidFill>
+              </a:rPr>
+              <a:t>xếp</a:t>
+            </a:r>
+            <a:r>
+              <a:rPr lang="en-US" sz="2200" dirty="0" smtClean="0">
+                <a:solidFill>
+                  <a:schemeClr val="tx2"/>
+                </a:solidFill>
+              </a:rPr>
+              <a:t> </a:t>
+            </a:r>
+            <a:r>
+              <a:rPr lang="en-US" sz="2200" dirty="0" err="1" smtClean="0">
+                <a:solidFill>
+                  <a:schemeClr val="tx2"/>
+                </a:solidFill>
+              </a:rPr>
+              <a:t>từ</a:t>
+            </a:r>
+            <a:r>
+              <a:rPr lang="en-US" sz="2200" dirty="0" smtClean="0">
+                <a:solidFill>
+                  <a:schemeClr val="tx2"/>
+                </a:solidFill>
+              </a:rPr>
+              <a:t> </a:t>
+            </a:r>
+            <a:r>
+              <a:rPr lang="en-US" sz="2200" dirty="0" err="1" smtClean="0">
+                <a:solidFill>
+                  <a:schemeClr val="tx2"/>
+                </a:solidFill>
+              </a:rPr>
+              <a:t>điển</a:t>
+            </a:r>
+            <a:r>
+              <a:rPr lang="en-US" sz="2200" dirty="0" smtClean="0">
+                <a:solidFill>
+                  <a:schemeClr val="tx2"/>
+                </a:solidFill>
+              </a:rPr>
+              <a:t> </a:t>
+            </a:r>
+            <a:r>
+              <a:rPr lang="en-US" sz="2200" dirty="0" err="1" smtClean="0">
+                <a:solidFill>
+                  <a:schemeClr val="tx2"/>
+                </a:solidFill>
+              </a:rPr>
+              <a:t>cục</a:t>
+            </a:r>
+            <a:r>
+              <a:rPr lang="en-US" sz="2200" dirty="0" smtClean="0">
+                <a:solidFill>
+                  <a:schemeClr val="tx2"/>
+                </a:solidFill>
+              </a:rPr>
+              <a:t> </a:t>
+            </a:r>
+            <a:r>
+              <a:rPr lang="en-US" sz="2200" dirty="0" err="1" smtClean="0">
+                <a:solidFill>
+                  <a:schemeClr val="tx2"/>
+                </a:solidFill>
+              </a:rPr>
+              <a:t>bộ</a:t>
+            </a:r>
+            <a:r>
+              <a:rPr lang="en-US" sz="2200" dirty="0" smtClean="0">
+                <a:solidFill>
+                  <a:schemeClr val="tx2"/>
+                </a:solidFill>
+              </a:rPr>
+              <a:t> -&gt; </a:t>
+            </a:r>
+            <a:r>
+              <a:rPr lang="en-US" sz="2200" dirty="0" err="1" smtClean="0">
+                <a:solidFill>
+                  <a:schemeClr val="tx2"/>
+                </a:solidFill>
+              </a:rPr>
+              <a:t>Ghi</a:t>
+            </a:r>
+            <a:r>
+              <a:rPr lang="en-US" sz="2200" dirty="0" smtClean="0">
+                <a:solidFill>
+                  <a:schemeClr val="tx2"/>
+                </a:solidFill>
+              </a:rPr>
+              <a:t> </a:t>
+            </a:r>
+            <a:r>
+              <a:rPr lang="en-US" sz="2200" dirty="0" err="1" smtClean="0">
+                <a:solidFill>
+                  <a:schemeClr val="tx2"/>
+                </a:solidFill>
+              </a:rPr>
+              <a:t>ra</a:t>
+            </a:r>
+            <a:r>
+              <a:rPr lang="en-US" sz="2200" dirty="0" smtClean="0">
+                <a:solidFill>
+                  <a:schemeClr val="tx2"/>
+                </a:solidFill>
+              </a:rPr>
+              <a:t> </a:t>
+            </a:r>
+            <a:r>
+              <a:rPr lang="en-US" sz="2200" dirty="0" err="1" smtClean="0">
+                <a:solidFill>
+                  <a:schemeClr val="tx2"/>
+                </a:solidFill>
+              </a:rPr>
+              <a:t>đĩa</a:t>
+            </a:r>
+            <a:r>
+              <a:rPr lang="en-US" sz="2200" dirty="0" smtClean="0">
+                <a:solidFill>
+                  <a:schemeClr val="tx2"/>
+                </a:solidFill>
+              </a:rPr>
+              <a:t> -&gt; </a:t>
+            </a:r>
+            <a:r>
+              <a:rPr lang="en-US" sz="2200" dirty="0" err="1" smtClean="0">
+                <a:solidFill>
+                  <a:schemeClr val="tx2"/>
+                </a:solidFill>
+              </a:rPr>
+              <a:t>hợp</a:t>
+            </a:r>
+            <a:r>
+              <a:rPr lang="en-US" sz="2200" dirty="0" smtClean="0">
+                <a:solidFill>
+                  <a:schemeClr val="tx2"/>
+                </a:solidFill>
+              </a:rPr>
+              <a:t> </a:t>
+            </a:r>
+            <a:r>
+              <a:rPr lang="en-US" sz="2200" dirty="0" err="1" smtClean="0">
+                <a:solidFill>
+                  <a:schemeClr val="tx2"/>
+                </a:solidFill>
+              </a:rPr>
+              <a:t>nhất</a:t>
+            </a:r>
+            <a:r>
+              <a:rPr lang="en-US" sz="2200" dirty="0" smtClean="0">
+                <a:solidFill>
+                  <a:schemeClr val="tx2"/>
+                </a:solidFill>
+              </a:rPr>
+              <a:t> </a:t>
+            </a:r>
+            <a:r>
+              <a:rPr lang="en-US" sz="2200" dirty="0" err="1" smtClean="0">
+                <a:solidFill>
+                  <a:schemeClr val="tx2"/>
+                </a:solidFill>
+              </a:rPr>
+              <a:t>khối</a:t>
+            </a:r>
+            <a:endParaRPr lang="vi-VN" sz="2200" dirty="0" smtClean="0">
               <a:solidFill>
                 <a:schemeClr val="tx2"/>
               </a:solidFill>
@@ -24489,60 +24879,47 @@
           </a:p>
         </p:txBody>
       </p:sp>
-      <p:pic>
-        <p:nvPicPr>
-          <p:cNvPr id="1026" name="Picture 2"/>
-          <p:cNvPicPr>
-            <a:picLocks noChangeAspect="1" noChangeArrowheads="1"/>
-          </p:cNvPicPr>
+      <p:sp>
+        <p:nvSpPr>
+          <p:cNvPr id="2" name="TextBox 1"/>
+          <p:cNvSpPr txBox="1"/>
           <p:nvPr/>
-        </p:nvPicPr>
-        <p:blipFill>
-          <a:blip r:embed="rId2">
-            <a:extLst>
-              <a:ext uri="{28A0092B-C50C-407E-A947-70E740481C1C}">
-                <a14:useLocalDpi xmlns:a14="http://schemas.microsoft.com/office/drawing/2010/main" val="0"/>
-              </a:ext>
-            </a:extLst>
-          </a:blip>
-          <a:srcRect/>
-          <a:stretch>
-            <a:fillRect/>
-          </a:stretch>
-        </p:blipFill>
-        <p:spPr bwMode="auto">
+        </p:nvSpPr>
+        <p:spPr>
           <a:xfrm>
-            <a:off x="2555776" y="4365104"/>
-            <a:ext cx="3528392" cy="1889397"/>
+            <a:off x="3203848" y="4653136"/>
+            <a:ext cx="2880320" cy="923330"/>
           </a:xfrm>
           <a:prstGeom prst="rect">
             <a:avLst/>
           </a:prstGeom>
           <a:noFill/>
-          <a:ln>
-            <a:noFill/>
-          </a:ln>
-          <a:extLst>
-            <a:ext uri="{909E8E84-426E-40DD-AFC4-6F175D3DCCD1}">
-              <a14:hiddenFill xmlns:a14="http://schemas.microsoft.com/office/drawing/2010/main">
-                <a:solidFill>
-                  <a:schemeClr val="accent1"/>
-                </a:solidFill>
-              </a14:hiddenFill>
-            </a:ext>
-            <a:ext uri="{91240B29-F687-4F45-9708-019B960494DF}">
-              <a14:hiddenLine xmlns:a14="http://schemas.microsoft.com/office/drawing/2010/main" w="9525">
-                <a:solidFill>
-                  <a:schemeClr val="tx1"/>
-                </a:solidFill>
-                <a:miter lim="800000"/>
-                <a:headEnd/>
-                <a:tailEnd/>
-              </a14:hiddenLine>
-            </a:ext>
-          </a:extLst>
         </p:spPr>
-      </p:pic>
+        <p:txBody>
+          <a:bodyPr wrap="square" rtlCol="0">
+            <a:spAutoFit/>
+          </a:bodyPr>
+          <a:lstStyle/>
+          <a:p>
+            <a:r>
+              <a:rPr lang="en-US" dirty="0" smtClean="0"/>
+              <a:t>      I3   I2   I1   I0</a:t>
+            </a:r>
+          </a:p>
+          <a:p>
+            <a:r>
+              <a:rPr lang="en-US" dirty="0" smtClean="0"/>
+              <a:t>2     0    0     0    1</a:t>
+            </a:r>
+          </a:p>
+          <a:p>
+            <a:r>
+              <a:rPr lang="en-US" dirty="0" smtClean="0"/>
+              <a:t>4     0    0     1    0</a:t>
+            </a:r>
+          </a:p>
+        </p:txBody>
+      </p:sp>
     </p:spTree>
     <p:extLst>
       <p:ext uri="{BB962C8B-B14F-4D97-AF65-F5344CB8AC3E}">
@@ -24625,11 +25002,7 @@
             </a:r>
             <a:r>
               <a:rPr lang="vi-VN" smtClean="0"/>
-              <a:t>tập </a:t>
-            </a:r>
-            <a:r>
-              <a:rPr lang="vi-VN" smtClean="0"/>
-              <a:t>12.2</a:t>
+              <a:t>tập 12.2</a:t>
             </a:r>
             <a:endParaRPr lang="vi-VN" dirty="0"/>
           </a:p>
@@ -27239,7 +27612,7 @@
   </a:extraClrSchemeLst>
   <a:extLst>
     <a:ext uri="{05A4C25C-085E-4340-85A3-A5531E510DB2}">
-      <thm15:themeFamily xmlns="" xmlns:thm15="http://schemas.microsoft.com/office/thememl/2012/main" name="Office Theme" id="{62F939B6-93AF-4DB8-9C6B-D6C7DFDC589F}" vid="{4A3C46E8-61CC-4603-A589-7422A47A8E4A}"/>
+      <thm15:themeFamily xmlns:thm15="http://schemas.microsoft.com/office/thememl/2012/main" xmlns="" name="Office Theme" id="{62F939B6-93AF-4DB8-9C6B-D6C7DFDC589F}" vid="{4A3C46E8-61CC-4603-A589-7422A47A8E4A}"/>
     </a:ext>
   </a:extLst>
 </a:theme>
@@ -27288,7 +27661,7 @@
     </a:clrScheme>
     <a:fontScheme name="Office">
       <a:majorFont>
-        <a:latin typeface="Calibri Light" panose="020F0302020204030204"/>
+        <a:latin typeface="Calibri Light"/>
         <a:ea typeface=""/>
         <a:cs typeface=""/>
         <a:font script="Jpan" typeface="ＭＳ Ｐゴシック"/>
@@ -27323,7 +27696,7 @@
         <a:font script="Geor" typeface="Sylfaen"/>
       </a:majorFont>
       <a:minorFont>
-        <a:latin typeface="Calibri" panose="020F0502020204030204"/>
+        <a:latin typeface="Calibri"/>
         <a:ea typeface=""/>
         <a:cs typeface=""/>
         <a:font script="Jpan" typeface="ＭＳ Ｐゴシック"/>
@@ -27500,7 +27873,7 @@
   <a:extraClrSchemeLst/>
   <a:extLst>
     <a:ext uri="{05A4C25C-085E-4340-85A3-A5531E510DB2}">
-      <thm15:themeFamily xmlns="" xmlns:thm15="http://schemas.microsoft.com/office/thememl/2012/main" name="Office Theme" id="{62F939B6-93AF-4DB8-9C6B-D6C7DFDC589F}" vid="{4A3C46E8-61CC-4603-A589-7422A47A8E4A}"/>
+      <thm15:themeFamily xmlns:thm15="http://schemas.microsoft.com/office/thememl/2012/main" xmlns="" name="Office Theme" id="{62F939B6-93AF-4DB8-9C6B-D6C7DFDC589F}" vid="{4A3C46E8-61CC-4603-A589-7422A47A8E4A}"/>
     </a:ext>
   </a:extLst>
 </a:theme>

</xml_diff>